<commit_message>
Update Presentation and add old json server
</commit_message>
<xml_diff>
--- a/Resources/Endpräsentation/aduno.pptx
+++ b/Resources/Endpräsentation/aduno.pptx
@@ -10612,15 +10612,25 @@
             <p:ph type="title"/>
           </p:nvPr>
         </p:nvSpPr>
-        <p:spPr/>
+        <p:spPr>
+          <a:xfrm>
+            <a:off x="3933825" y="1382841"/>
+            <a:ext cx="10515600" cy="1325563"/>
+          </a:xfrm>
+        </p:spPr>
         <p:txBody>
           <a:bodyPr/>
           <a:lstStyle/>
           <a:p>
             <a:r>
               <a:rPr lang="de-DE" dirty="0"/>
-              <a:t>				    Zeitraffer</a:t>
+              <a:t>				    </a:t>
             </a:r>
+            <a:r>
+              <a:rPr lang="de-DE" sz="3600" dirty="0" err="1"/>
+              <a:t>aduno</a:t>
+            </a:r>
+            <a:endParaRPr lang="de-DE" sz="3600" dirty="0"/>
           </a:p>
         </p:txBody>
       </p:sp>
@@ -10733,6 +10743,279 @@
               <a:rPr lang="de-DE" sz="3600" dirty="0"/>
               <a:t>ReSign E-Paper</a:t>
             </a:r>
+          </a:p>
+        </p:txBody>
+      </p:sp>
+      <p:sp>
+        <p:nvSpPr>
+          <p:cNvPr id="5" name="Titel 1">
+            <a:extLst>
+              <a:ext uri="{FF2B5EF4-FFF2-40B4-BE49-F238E27FC236}">
+                <a16:creationId xmlns:a16="http://schemas.microsoft.com/office/drawing/2014/main" id="{8E1E2BBA-2E19-A9E7-9078-F39D98D7A6FC}"/>
+              </a:ext>
+            </a:extLst>
+          </p:cNvPr>
+          <p:cNvSpPr txBox="1">
+            <a:spLocks/>
+          </p:cNvSpPr>
+          <p:nvPr/>
+        </p:nvSpPr>
+        <p:spPr>
+          <a:xfrm>
+            <a:off x="990600" y="327025"/>
+            <a:ext cx="10515600" cy="1325563"/>
+          </a:xfrm>
+          <a:prstGeom prst="rect">
+            <a:avLst/>
+          </a:prstGeom>
+        </p:spPr>
+        <p:txBody>
+          <a:bodyPr vert="horz" lIns="91440" tIns="45720" rIns="91440" bIns="45720" rtlCol="0" anchor="ctr">
+            <a:normAutofit/>
+          </a:bodyPr>
+          <a:lstStyle>
+            <a:lvl1pPr algn="l" defTabSz="914400" rtl="0" eaLnBrk="1" latinLnBrk="0" hangingPunct="1">
+              <a:lnSpc>
+                <a:spcPct val="90000"/>
+              </a:lnSpc>
+              <a:spcBef>
+                <a:spcPct val="0"/>
+              </a:spcBef>
+              <a:buNone/>
+              <a:defRPr sz="4400" kern="1200">
+                <a:solidFill>
+                  <a:schemeClr val="tx1"/>
+                </a:solidFill>
+                <a:latin typeface="+mj-lt"/>
+                <a:ea typeface="+mj-ea"/>
+                <a:cs typeface="+mj-cs"/>
+              </a:defRPr>
+            </a:lvl1pPr>
+          </a:lstStyle>
+          <a:p>
+            <a:r>
+              <a:rPr lang="de-DE"/>
+              <a:t>				    Zeitraffer</a:t>
+            </a:r>
+            <a:endParaRPr lang="de-DE" dirty="0"/>
+          </a:p>
+        </p:txBody>
+      </p:sp>
+      <p:sp>
+        <p:nvSpPr>
+          <p:cNvPr id="7" name="Inhaltsplatzhalter 2">
+            <a:extLst>
+              <a:ext uri="{FF2B5EF4-FFF2-40B4-BE49-F238E27FC236}">
+                <a16:creationId xmlns:a16="http://schemas.microsoft.com/office/drawing/2014/main" id="{F334546D-F063-831D-2604-528F09BC4471}"/>
+              </a:ext>
+            </a:extLst>
+          </p:cNvPr>
+          <p:cNvSpPr txBox="1">
+            <a:spLocks/>
+          </p:cNvSpPr>
+          <p:nvPr/>
+        </p:nvSpPr>
+        <p:spPr>
+          <a:xfrm>
+            <a:off x="6848475" y="2721363"/>
+            <a:ext cx="4051041" cy="4351338"/>
+          </a:xfrm>
+          <a:prstGeom prst="rect">
+            <a:avLst/>
+          </a:prstGeom>
+        </p:spPr>
+        <p:txBody>
+          <a:bodyPr vert="horz" lIns="91440" tIns="45720" rIns="91440" bIns="45720" rtlCol="0">
+            <a:normAutofit/>
+          </a:bodyPr>
+          <a:lstStyle>
+            <a:lvl1pPr marL="228600" indent="-228600" algn="l" defTabSz="914400" rtl="0" eaLnBrk="1" latinLnBrk="0" hangingPunct="1">
+              <a:lnSpc>
+                <a:spcPct val="90000"/>
+              </a:lnSpc>
+              <a:spcBef>
+                <a:spcPts val="1000"/>
+              </a:spcBef>
+              <a:buFont typeface="Arial" panose="020B0604020202020204" pitchFamily="34" charset="0"/>
+              <a:buChar char="•"/>
+              <a:defRPr sz="2800" kern="1200">
+                <a:solidFill>
+                  <a:schemeClr val="tx1"/>
+                </a:solidFill>
+                <a:latin typeface="+mn-lt"/>
+                <a:ea typeface="+mn-ea"/>
+                <a:cs typeface="+mn-cs"/>
+              </a:defRPr>
+            </a:lvl1pPr>
+            <a:lvl2pPr marL="685800" indent="-228600" algn="l" defTabSz="914400" rtl="0" eaLnBrk="1" latinLnBrk="0" hangingPunct="1">
+              <a:lnSpc>
+                <a:spcPct val="90000"/>
+              </a:lnSpc>
+              <a:spcBef>
+                <a:spcPts val="500"/>
+              </a:spcBef>
+              <a:buFont typeface="Arial" panose="020B0604020202020204" pitchFamily="34" charset="0"/>
+              <a:buChar char="•"/>
+              <a:defRPr sz="2400" kern="1200">
+                <a:solidFill>
+                  <a:schemeClr val="tx1"/>
+                </a:solidFill>
+                <a:latin typeface="+mn-lt"/>
+                <a:ea typeface="+mn-ea"/>
+                <a:cs typeface="+mn-cs"/>
+              </a:defRPr>
+            </a:lvl2pPr>
+            <a:lvl3pPr marL="1143000" indent="-228600" algn="l" defTabSz="914400" rtl="0" eaLnBrk="1" latinLnBrk="0" hangingPunct="1">
+              <a:lnSpc>
+                <a:spcPct val="90000"/>
+              </a:lnSpc>
+              <a:spcBef>
+                <a:spcPts val="500"/>
+              </a:spcBef>
+              <a:buFont typeface="Arial" panose="020B0604020202020204" pitchFamily="34" charset="0"/>
+              <a:buChar char="•"/>
+              <a:defRPr sz="2000" kern="1200">
+                <a:solidFill>
+                  <a:schemeClr val="tx1"/>
+                </a:solidFill>
+                <a:latin typeface="+mn-lt"/>
+                <a:ea typeface="+mn-ea"/>
+                <a:cs typeface="+mn-cs"/>
+              </a:defRPr>
+            </a:lvl3pPr>
+            <a:lvl4pPr marL="1600200" indent="-228600" algn="l" defTabSz="914400" rtl="0" eaLnBrk="1" latinLnBrk="0" hangingPunct="1">
+              <a:lnSpc>
+                <a:spcPct val="90000"/>
+              </a:lnSpc>
+              <a:spcBef>
+                <a:spcPts val="500"/>
+              </a:spcBef>
+              <a:buFont typeface="Arial" panose="020B0604020202020204" pitchFamily="34" charset="0"/>
+              <a:buChar char="•"/>
+              <a:defRPr sz="1800" kern="1200">
+                <a:solidFill>
+                  <a:schemeClr val="tx1"/>
+                </a:solidFill>
+                <a:latin typeface="+mn-lt"/>
+                <a:ea typeface="+mn-ea"/>
+                <a:cs typeface="+mn-cs"/>
+              </a:defRPr>
+            </a:lvl4pPr>
+            <a:lvl5pPr marL="2057400" indent="-228600" algn="l" defTabSz="914400" rtl="0" eaLnBrk="1" latinLnBrk="0" hangingPunct="1">
+              <a:lnSpc>
+                <a:spcPct val="90000"/>
+              </a:lnSpc>
+              <a:spcBef>
+                <a:spcPts val="500"/>
+              </a:spcBef>
+              <a:buFont typeface="Arial" panose="020B0604020202020204" pitchFamily="34" charset="0"/>
+              <a:buChar char="•"/>
+              <a:defRPr sz="1800" kern="1200">
+                <a:solidFill>
+                  <a:schemeClr val="tx1"/>
+                </a:solidFill>
+                <a:latin typeface="+mn-lt"/>
+                <a:ea typeface="+mn-ea"/>
+                <a:cs typeface="+mn-cs"/>
+              </a:defRPr>
+            </a:lvl5pPr>
+            <a:lvl6pPr marL="2514600" indent="-228600" algn="l" defTabSz="914400" rtl="0" eaLnBrk="1" latinLnBrk="0" hangingPunct="1">
+              <a:lnSpc>
+                <a:spcPct val="90000"/>
+              </a:lnSpc>
+              <a:spcBef>
+                <a:spcPts val="500"/>
+              </a:spcBef>
+              <a:buFont typeface="Arial" panose="020B0604020202020204" pitchFamily="34" charset="0"/>
+              <a:buChar char="•"/>
+              <a:defRPr sz="1800" kern="1200">
+                <a:solidFill>
+                  <a:schemeClr val="tx1"/>
+                </a:solidFill>
+                <a:latin typeface="+mn-lt"/>
+                <a:ea typeface="+mn-ea"/>
+                <a:cs typeface="+mn-cs"/>
+              </a:defRPr>
+            </a:lvl6pPr>
+            <a:lvl7pPr marL="2971800" indent="-228600" algn="l" defTabSz="914400" rtl="0" eaLnBrk="1" latinLnBrk="0" hangingPunct="1">
+              <a:lnSpc>
+                <a:spcPct val="90000"/>
+              </a:lnSpc>
+              <a:spcBef>
+                <a:spcPts val="500"/>
+              </a:spcBef>
+              <a:buFont typeface="Arial" panose="020B0604020202020204" pitchFamily="34" charset="0"/>
+              <a:buChar char="•"/>
+              <a:defRPr sz="1800" kern="1200">
+                <a:solidFill>
+                  <a:schemeClr val="tx1"/>
+                </a:solidFill>
+                <a:latin typeface="+mn-lt"/>
+                <a:ea typeface="+mn-ea"/>
+                <a:cs typeface="+mn-cs"/>
+              </a:defRPr>
+            </a:lvl7pPr>
+            <a:lvl8pPr marL="3429000" indent="-228600" algn="l" defTabSz="914400" rtl="0" eaLnBrk="1" latinLnBrk="0" hangingPunct="1">
+              <a:lnSpc>
+                <a:spcPct val="90000"/>
+              </a:lnSpc>
+              <a:spcBef>
+                <a:spcPts val="500"/>
+              </a:spcBef>
+              <a:buFont typeface="Arial" panose="020B0604020202020204" pitchFamily="34" charset="0"/>
+              <a:buChar char="•"/>
+              <a:defRPr sz="1800" kern="1200">
+                <a:solidFill>
+                  <a:schemeClr val="tx1"/>
+                </a:solidFill>
+                <a:latin typeface="+mn-lt"/>
+                <a:ea typeface="+mn-ea"/>
+                <a:cs typeface="+mn-cs"/>
+              </a:defRPr>
+            </a:lvl8pPr>
+            <a:lvl9pPr marL="3886200" indent="-228600" algn="l" defTabSz="914400" rtl="0" eaLnBrk="1" latinLnBrk="0" hangingPunct="1">
+              <a:lnSpc>
+                <a:spcPct val="90000"/>
+              </a:lnSpc>
+              <a:spcBef>
+                <a:spcPts val="500"/>
+              </a:spcBef>
+              <a:buFont typeface="Arial" panose="020B0604020202020204" pitchFamily="34" charset="0"/>
+              <a:buChar char="•"/>
+              <a:defRPr sz="1800" kern="1200">
+                <a:solidFill>
+                  <a:schemeClr val="tx1"/>
+                </a:solidFill>
+                <a:latin typeface="+mn-lt"/>
+                <a:ea typeface="+mn-ea"/>
+                <a:cs typeface="+mn-cs"/>
+              </a:defRPr>
+            </a:lvl9pPr>
+          </a:lstStyle>
+          <a:p>
+            <a:r>
+              <a:rPr lang="de-DE" sz="2400"/>
+              <a:t>Türschilder digitalisieren</a:t>
+            </a:r>
+          </a:p>
+          <a:p>
+            <a:r>
+              <a:rPr lang="de-DE" sz="2400"/>
+              <a:t>Displayanzeige mit Klasse, Klassenvorstand, Uhrzeit</a:t>
+            </a:r>
+          </a:p>
+          <a:p>
+            <a:r>
+              <a:rPr lang="de-DE" sz="2400"/>
+              <a:t>Features: Stundenplan anzeigen, Klassen Reservierung,  </a:t>
+            </a:r>
+            <a:r>
+              <a:rPr lang="de-DE" sz="2400" b="1"/>
+              <a:t>Anwesenheit checken</a:t>
+            </a:r>
+          </a:p>
+          <a:p>
+            <a:endParaRPr lang="de-DE" sz="2400" dirty="0"/>
           </a:p>
         </p:txBody>
       </p:sp>

</xml_diff>